<commit_message>
add bamazon to portfolio
</commit_message>
<xml_diff>
--- a/img/portfolio/portfolioimages.pptx
+++ b/img/portfolio/portfolioimages.pptx
@@ -5,13 +5,14 @@
     <p:sldMasterId id="2147483660" r:id="rId1"/>
   </p:sldMasterIdLst>
   <p:notesMasterIdLst>
-    <p:notesMasterId r:id="rId6"/>
+    <p:notesMasterId r:id="rId7"/>
   </p:notesMasterIdLst>
   <p:sldIdLst>
     <p:sldId id="256" r:id="rId2"/>
     <p:sldId id="257" r:id="rId3"/>
     <p:sldId id="258" r:id="rId4"/>
-    <p:sldId id="259" r:id="rId5"/>
+    <p:sldId id="260" r:id="rId5"/>
+    <p:sldId id="259" r:id="rId6"/>
   </p:sldIdLst>
   <p:sldSz cx="5705475" cy="4114800"/>
   <p:notesSz cx="6858000" cy="9144000"/>
@@ -211,7 +212,7 @@
           <a:p>
             <a:fld id="{FCFBAACC-0C4E-6A46-909C-311DADBEBC3F}" type="datetimeFigureOut">
               <a:rPr lang="en-US" smtClean="0"/>
-              <a:t>4/16/2019</a:t>
+              <a:t>4/29/19</a:t>
             </a:fld>
             <a:endParaRPr lang="en-US"/>
           </a:p>
@@ -609,7 +610,7 @@
           <a:p>
             <a:fld id="{08259A66-32B0-534A-AA69-658707479B3F}" type="datetimeFigureOut">
               <a:rPr lang="en-US" smtClean="0"/>
-              <a:t>4/16/2019</a:t>
+              <a:t>4/29/19</a:t>
             </a:fld>
             <a:endParaRPr lang="en-US"/>
           </a:p>
@@ -779,7 +780,7 @@
           <a:p>
             <a:fld id="{08259A66-32B0-534A-AA69-658707479B3F}" type="datetimeFigureOut">
               <a:rPr lang="en-US" smtClean="0"/>
-              <a:t>4/16/2019</a:t>
+              <a:t>4/29/19</a:t>
             </a:fld>
             <a:endParaRPr lang="en-US"/>
           </a:p>
@@ -959,7 +960,7 @@
           <a:p>
             <a:fld id="{08259A66-32B0-534A-AA69-658707479B3F}" type="datetimeFigureOut">
               <a:rPr lang="en-US" smtClean="0"/>
-              <a:t>4/16/2019</a:t>
+              <a:t>4/29/19</a:t>
             </a:fld>
             <a:endParaRPr lang="en-US"/>
           </a:p>
@@ -1129,7 +1130,7 @@
           <a:p>
             <a:fld id="{08259A66-32B0-534A-AA69-658707479B3F}" type="datetimeFigureOut">
               <a:rPr lang="en-US" smtClean="0"/>
-              <a:t>4/16/2019</a:t>
+              <a:t>4/29/19</a:t>
             </a:fld>
             <a:endParaRPr lang="en-US"/>
           </a:p>
@@ -1373,7 +1374,7 @@
           <a:p>
             <a:fld id="{08259A66-32B0-534A-AA69-658707479B3F}" type="datetimeFigureOut">
               <a:rPr lang="en-US" smtClean="0"/>
-              <a:t>4/16/2019</a:t>
+              <a:t>4/29/19</a:t>
             </a:fld>
             <a:endParaRPr lang="en-US"/>
           </a:p>
@@ -1605,7 +1606,7 @@
           <a:p>
             <a:fld id="{08259A66-32B0-534A-AA69-658707479B3F}" type="datetimeFigureOut">
               <a:rPr lang="en-US" smtClean="0"/>
-              <a:t>4/16/2019</a:t>
+              <a:t>4/29/19</a:t>
             </a:fld>
             <a:endParaRPr lang="en-US"/>
           </a:p>
@@ -1972,7 +1973,7 @@
           <a:p>
             <a:fld id="{08259A66-32B0-534A-AA69-658707479B3F}" type="datetimeFigureOut">
               <a:rPr lang="en-US" smtClean="0"/>
-              <a:t>4/16/2019</a:t>
+              <a:t>4/29/19</a:t>
             </a:fld>
             <a:endParaRPr lang="en-US"/>
           </a:p>
@@ -2090,7 +2091,7 @@
           <a:p>
             <a:fld id="{08259A66-32B0-534A-AA69-658707479B3F}" type="datetimeFigureOut">
               <a:rPr lang="en-US" smtClean="0"/>
-              <a:t>4/16/2019</a:t>
+              <a:t>4/29/19</a:t>
             </a:fld>
             <a:endParaRPr lang="en-US"/>
           </a:p>
@@ -2185,7 +2186,7 @@
           <a:p>
             <a:fld id="{08259A66-32B0-534A-AA69-658707479B3F}" type="datetimeFigureOut">
               <a:rPr lang="en-US" smtClean="0"/>
-              <a:t>4/16/2019</a:t>
+              <a:t>4/29/19</a:t>
             </a:fld>
             <a:endParaRPr lang="en-US"/>
           </a:p>
@@ -2462,7 +2463,7 @@
           <a:p>
             <a:fld id="{08259A66-32B0-534A-AA69-658707479B3F}" type="datetimeFigureOut">
               <a:rPr lang="en-US" smtClean="0"/>
-              <a:t>4/16/2019</a:t>
+              <a:t>4/29/19</a:t>
             </a:fld>
             <a:endParaRPr lang="en-US"/>
           </a:p>
@@ -2719,7 +2720,7 @@
           <a:p>
             <a:fld id="{08259A66-32B0-534A-AA69-658707479B3F}" type="datetimeFigureOut">
               <a:rPr lang="en-US" smtClean="0"/>
-              <a:t>4/16/2019</a:t>
+              <a:t>4/29/19</a:t>
             </a:fld>
             <a:endParaRPr lang="en-US"/>
           </a:p>
@@ -2932,7 +2933,7 @@
           <a:p>
             <a:fld id="{08259A66-32B0-534A-AA69-658707479B3F}" type="datetimeFigureOut">
               <a:rPr lang="en-US" smtClean="0"/>
-              <a:t>4/16/2019</a:t>
+              <a:t>4/29/19</a:t>
             </a:fld>
             <a:endParaRPr lang="en-US"/>
           </a:p>
@@ -3356,7 +3357,7 @@
         </p:nvGrpSpPr>
         <p:grpSpPr>
           <a:xfrm>
-            <a:off x="1837765" y="878225"/>
+            <a:off x="1837765" y="908614"/>
             <a:ext cx="2319327" cy="2207060"/>
             <a:chOff x="233008" y="500281"/>
             <a:chExt cx="3108295" cy="3042920"/>
@@ -3678,6 +3679,129 @@
 </file>
 
 <file path=ppt/slides/slide4.xml><?xml version="1.0" encoding="utf-8"?>
+<p:sld xmlns:a="http://schemas.openxmlformats.org/drawingml/2006/main" xmlns:r="http://schemas.openxmlformats.org/officeDocument/2006/relationships" xmlns:p="http://schemas.openxmlformats.org/presentationml/2006/main">
+  <p:cSld>
+    <p:bg>
+      <p:bgPr>
+        <a:solidFill>
+          <a:srgbClr val="F07133"/>
+        </a:solidFill>
+        <a:effectLst/>
+      </p:bgPr>
+    </p:bg>
+    <p:spTree>
+      <p:nvGrpSpPr>
+        <p:cNvPr id="1" name=""/>
+        <p:cNvGrpSpPr/>
+        <p:nvPr/>
+      </p:nvGrpSpPr>
+      <p:grpSpPr>
+        <a:xfrm>
+          <a:off x="0" y="0"/>
+          <a:ext cx="0" cy="0"/>
+          <a:chOff x="0" y="0"/>
+          <a:chExt cx="0" cy="0"/>
+        </a:xfrm>
+      </p:grpSpPr>
+      <p:sp>
+        <p:nvSpPr>
+          <p:cNvPr id="10" name="Rectangle 9">
+            <a:extLst>
+              <a:ext uri="{FF2B5EF4-FFF2-40B4-BE49-F238E27FC236}">
+                <a16:creationId xmlns:a16="http://schemas.microsoft.com/office/drawing/2014/main" id="{4D1E4AAC-E67E-CC4B-99E0-D6BB79E3C2E3}"/>
+              </a:ext>
+            </a:extLst>
+          </p:cNvPr>
+          <p:cNvSpPr/>
+          <p:nvPr/>
+        </p:nvSpPr>
+        <p:spPr>
+          <a:xfrm>
+            <a:off x="1439339" y="3056267"/>
+            <a:ext cx="2685992" cy="769441"/>
+          </a:xfrm>
+          <a:prstGeom prst="rect">
+            <a:avLst/>
+          </a:prstGeom>
+          <a:noFill/>
+        </p:spPr>
+        <p:txBody>
+          <a:bodyPr wrap="none" lIns="91440" tIns="45720" rIns="91440" bIns="45720">
+            <a:spAutoFit/>
+          </a:bodyPr>
+          <a:lstStyle/>
+          <a:p>
+            <a:pPr algn="ctr"/>
+            <a:r>
+              <a:rPr lang="en-US" sz="4400" b="1" cap="none" spc="0" dirty="0">
+                <a:ln w="0"/>
+                <a:solidFill>
+                  <a:srgbClr val="2C3E50"/>
+                </a:solidFill>
+                <a:effectLst>
+                  <a:outerShdw blurRad="38100" dist="25400" dir="5400000" algn="ctr" rotWithShape="0">
+                    <a:srgbClr val="6E747A">
+                      <a:alpha val="43000"/>
+                    </a:srgbClr>
+                  </a:outerShdw>
+                </a:effectLst>
+                <a:latin typeface="Lato Black" panose="020F0A02020204030203" pitchFamily="34" charset="0"/>
+                <a:ea typeface="Roboto Black" panose="02000000000000000000" pitchFamily="2" charset="0"/>
+              </a:rPr>
+              <a:t>BAMAZON</a:t>
+            </a:r>
+          </a:p>
+        </p:txBody>
+      </p:sp>
+      <p:pic>
+        <p:nvPicPr>
+          <p:cNvPr id="4" name="Picture 3">
+            <a:extLst>
+              <a:ext uri="{FF2B5EF4-FFF2-40B4-BE49-F238E27FC236}">
+                <a16:creationId xmlns:a16="http://schemas.microsoft.com/office/drawing/2014/main" id="{B9FD77E4-62A3-8346-8426-123442A50E07}"/>
+              </a:ext>
+            </a:extLst>
+          </p:cNvPr>
+          <p:cNvPicPr>
+            <a:picLocks noChangeAspect="1"/>
+          </p:cNvPicPr>
+          <p:nvPr/>
+        </p:nvPicPr>
+        <p:blipFill>
+          <a:blip r:embed="rId2">
+            <a:alphaModFix/>
+          </a:blip>
+          <a:stretch>
+            <a:fillRect/>
+          </a:stretch>
+        </p:blipFill>
+        <p:spPr>
+          <a:xfrm>
+            <a:off x="1540223" y="572045"/>
+            <a:ext cx="2484222" cy="2484222"/>
+          </a:xfrm>
+          <a:prstGeom prst="ellipse">
+            <a:avLst/>
+          </a:prstGeom>
+          <a:solidFill>
+            <a:schemeClr val="bg2"/>
+          </a:solidFill>
+        </p:spPr>
+      </p:pic>
+    </p:spTree>
+    <p:extLst>
+      <p:ext uri="{BB962C8B-B14F-4D97-AF65-F5344CB8AC3E}">
+        <p14:creationId xmlns:p14="http://schemas.microsoft.com/office/powerpoint/2010/main" val="4192814362"/>
+      </p:ext>
+    </p:extLst>
+  </p:cSld>
+  <p:clrMapOvr>
+    <a:masterClrMapping/>
+  </p:clrMapOvr>
+</p:sld>
+</file>
+
+<file path=ppt/slides/slide5.xml><?xml version="1.0" encoding="utf-8"?>
 <p:sld xmlns:a="http://schemas.openxmlformats.org/drawingml/2006/main" xmlns:r="http://schemas.openxmlformats.org/officeDocument/2006/relationships" xmlns:p="http://schemas.openxmlformats.org/presentationml/2006/main">
   <p:cSld>
     <p:bg>

</xml_diff>

<commit_message>
update portfolio with friendmatcher
</commit_message>
<xml_diff>
--- a/img/portfolio/portfolioimages.pptx
+++ b/img/portfolio/portfolioimages.pptx
@@ -5,14 +5,15 @@
     <p:sldMasterId id="2147483660" r:id="rId1"/>
   </p:sldMasterIdLst>
   <p:notesMasterIdLst>
-    <p:notesMasterId r:id="rId7"/>
+    <p:notesMasterId r:id="rId8"/>
   </p:notesMasterIdLst>
   <p:sldIdLst>
     <p:sldId id="256" r:id="rId2"/>
     <p:sldId id="257" r:id="rId3"/>
     <p:sldId id="258" r:id="rId4"/>
     <p:sldId id="260" r:id="rId5"/>
-    <p:sldId id="259" r:id="rId6"/>
+    <p:sldId id="261" r:id="rId6"/>
+    <p:sldId id="259" r:id="rId7"/>
   </p:sldIdLst>
   <p:sldSz cx="5705475" cy="4114800"/>
   <p:notesSz cx="6858000" cy="9144000"/>
@@ -212,7 +213,7 @@
           <a:p>
             <a:fld id="{FCFBAACC-0C4E-6A46-909C-311DADBEBC3F}" type="datetimeFigureOut">
               <a:rPr lang="en-US" smtClean="0"/>
-              <a:t>4/29/19</a:t>
+              <a:t>5/6/19</a:t>
             </a:fld>
             <a:endParaRPr lang="en-US"/>
           </a:p>
@@ -610,7 +611,7 @@
           <a:p>
             <a:fld id="{08259A66-32B0-534A-AA69-658707479B3F}" type="datetimeFigureOut">
               <a:rPr lang="en-US" smtClean="0"/>
-              <a:t>4/29/19</a:t>
+              <a:t>5/6/19</a:t>
             </a:fld>
             <a:endParaRPr lang="en-US"/>
           </a:p>
@@ -780,7 +781,7 @@
           <a:p>
             <a:fld id="{08259A66-32B0-534A-AA69-658707479B3F}" type="datetimeFigureOut">
               <a:rPr lang="en-US" smtClean="0"/>
-              <a:t>4/29/19</a:t>
+              <a:t>5/6/19</a:t>
             </a:fld>
             <a:endParaRPr lang="en-US"/>
           </a:p>
@@ -960,7 +961,7 @@
           <a:p>
             <a:fld id="{08259A66-32B0-534A-AA69-658707479B3F}" type="datetimeFigureOut">
               <a:rPr lang="en-US" smtClean="0"/>
-              <a:t>4/29/19</a:t>
+              <a:t>5/6/19</a:t>
             </a:fld>
             <a:endParaRPr lang="en-US"/>
           </a:p>
@@ -1130,7 +1131,7 @@
           <a:p>
             <a:fld id="{08259A66-32B0-534A-AA69-658707479B3F}" type="datetimeFigureOut">
               <a:rPr lang="en-US" smtClean="0"/>
-              <a:t>4/29/19</a:t>
+              <a:t>5/6/19</a:t>
             </a:fld>
             <a:endParaRPr lang="en-US"/>
           </a:p>
@@ -1374,7 +1375,7 @@
           <a:p>
             <a:fld id="{08259A66-32B0-534A-AA69-658707479B3F}" type="datetimeFigureOut">
               <a:rPr lang="en-US" smtClean="0"/>
-              <a:t>4/29/19</a:t>
+              <a:t>5/6/19</a:t>
             </a:fld>
             <a:endParaRPr lang="en-US"/>
           </a:p>
@@ -1606,7 +1607,7 @@
           <a:p>
             <a:fld id="{08259A66-32B0-534A-AA69-658707479B3F}" type="datetimeFigureOut">
               <a:rPr lang="en-US" smtClean="0"/>
-              <a:t>4/29/19</a:t>
+              <a:t>5/6/19</a:t>
             </a:fld>
             <a:endParaRPr lang="en-US"/>
           </a:p>
@@ -1973,7 +1974,7 @@
           <a:p>
             <a:fld id="{08259A66-32B0-534A-AA69-658707479B3F}" type="datetimeFigureOut">
               <a:rPr lang="en-US" smtClean="0"/>
-              <a:t>4/29/19</a:t>
+              <a:t>5/6/19</a:t>
             </a:fld>
             <a:endParaRPr lang="en-US"/>
           </a:p>
@@ -2091,7 +2092,7 @@
           <a:p>
             <a:fld id="{08259A66-32B0-534A-AA69-658707479B3F}" type="datetimeFigureOut">
               <a:rPr lang="en-US" smtClean="0"/>
-              <a:t>4/29/19</a:t>
+              <a:t>5/6/19</a:t>
             </a:fld>
             <a:endParaRPr lang="en-US"/>
           </a:p>
@@ -2186,7 +2187,7 @@
           <a:p>
             <a:fld id="{08259A66-32B0-534A-AA69-658707479B3F}" type="datetimeFigureOut">
               <a:rPr lang="en-US" smtClean="0"/>
-              <a:t>4/29/19</a:t>
+              <a:t>5/6/19</a:t>
             </a:fld>
             <a:endParaRPr lang="en-US"/>
           </a:p>
@@ -2463,7 +2464,7 @@
           <a:p>
             <a:fld id="{08259A66-32B0-534A-AA69-658707479B3F}" type="datetimeFigureOut">
               <a:rPr lang="en-US" smtClean="0"/>
-              <a:t>4/29/19</a:t>
+              <a:t>5/6/19</a:t>
             </a:fld>
             <a:endParaRPr lang="en-US"/>
           </a:p>
@@ -2720,7 +2721,7 @@
           <a:p>
             <a:fld id="{08259A66-32B0-534A-AA69-658707479B3F}" type="datetimeFigureOut">
               <a:rPr lang="en-US" smtClean="0"/>
-              <a:t>4/29/19</a:t>
+              <a:t>5/6/19</a:t>
             </a:fld>
             <a:endParaRPr lang="en-US"/>
           </a:p>
@@ -2933,7 +2934,7 @@
           <a:p>
             <a:fld id="{08259A66-32B0-534A-AA69-658707479B3F}" type="datetimeFigureOut">
               <a:rPr lang="en-US" smtClean="0"/>
-              <a:t>4/29/19</a:t>
+              <a:t>5/6/19</a:t>
             </a:fld>
             <a:endParaRPr lang="en-US"/>
           </a:p>
@@ -3802,6 +3803,126 @@
 </file>
 
 <file path=ppt/slides/slide5.xml><?xml version="1.0" encoding="utf-8"?>
+<p:sld xmlns:a="http://schemas.openxmlformats.org/drawingml/2006/main" xmlns:r="http://schemas.openxmlformats.org/officeDocument/2006/relationships" xmlns:p="http://schemas.openxmlformats.org/presentationml/2006/main">
+  <p:cSld>
+    <p:bg>
+      <p:bgPr>
+        <a:solidFill>
+          <a:srgbClr val="B18BFF"/>
+        </a:solidFill>
+        <a:effectLst/>
+      </p:bgPr>
+    </p:bg>
+    <p:spTree>
+      <p:nvGrpSpPr>
+        <p:cNvPr id="1" name=""/>
+        <p:cNvGrpSpPr/>
+        <p:nvPr/>
+      </p:nvGrpSpPr>
+      <p:grpSpPr>
+        <a:xfrm>
+          <a:off x="0" y="0"/>
+          <a:ext cx="0" cy="0"/>
+          <a:chOff x="0" y="0"/>
+          <a:chExt cx="0" cy="0"/>
+        </a:xfrm>
+      </p:grpSpPr>
+      <p:sp>
+        <p:nvSpPr>
+          <p:cNvPr id="10" name="Rectangle 9">
+            <a:extLst>
+              <a:ext uri="{FF2B5EF4-FFF2-40B4-BE49-F238E27FC236}">
+                <a16:creationId xmlns:a16="http://schemas.microsoft.com/office/drawing/2014/main" id="{4D1E4AAC-E67E-CC4B-99E0-D6BB79E3C2E3}"/>
+              </a:ext>
+            </a:extLst>
+          </p:cNvPr>
+          <p:cNvSpPr/>
+          <p:nvPr/>
+        </p:nvSpPr>
+        <p:spPr>
+          <a:xfrm>
+            <a:off x="607898" y="3056267"/>
+            <a:ext cx="4348883" cy="769441"/>
+          </a:xfrm>
+          <a:prstGeom prst="rect">
+            <a:avLst/>
+          </a:prstGeom>
+          <a:noFill/>
+        </p:spPr>
+        <p:txBody>
+          <a:bodyPr wrap="none" lIns="91440" tIns="45720" rIns="91440" bIns="45720">
+            <a:spAutoFit/>
+          </a:bodyPr>
+          <a:lstStyle/>
+          <a:p>
+            <a:pPr algn="ctr"/>
+            <a:r>
+              <a:rPr lang="en-US" sz="4400" b="1" cap="none" spc="0" dirty="0">
+                <a:ln w="0"/>
+                <a:solidFill>
+                  <a:srgbClr val="2C3E50"/>
+                </a:solidFill>
+                <a:effectLst>
+                  <a:outerShdw blurRad="38100" dist="25400" dir="5400000" algn="ctr" rotWithShape="0">
+                    <a:srgbClr val="6E747A">
+                      <a:alpha val="43000"/>
+                    </a:srgbClr>
+                  </a:outerShdw>
+                </a:effectLst>
+                <a:latin typeface="Lato Black" panose="020F0A02020204030203" pitchFamily="34" charset="0"/>
+                <a:ea typeface="Roboto Black" panose="02000000000000000000" pitchFamily="2" charset="0"/>
+              </a:rPr>
+              <a:t>FRIEND MATCHER</a:t>
+            </a:r>
+          </a:p>
+        </p:txBody>
+      </p:sp>
+      <p:pic>
+        <p:nvPicPr>
+          <p:cNvPr id="4" name="Picture 3">
+            <a:extLst>
+              <a:ext uri="{FF2B5EF4-FFF2-40B4-BE49-F238E27FC236}">
+                <a16:creationId xmlns:a16="http://schemas.microsoft.com/office/drawing/2014/main" id="{B9FD77E4-62A3-8346-8426-123442A50E07}"/>
+              </a:ext>
+            </a:extLst>
+          </p:cNvPr>
+          <p:cNvPicPr>
+            <a:picLocks noChangeAspect="1"/>
+          </p:cNvPicPr>
+          <p:nvPr/>
+        </p:nvPicPr>
+        <p:blipFill rotWithShape="1">
+          <a:blip r:embed="rId2"/>
+          <a:srcRect l="-4272" t="-18744" r="-4272" b="10200"/>
+          <a:stretch/>
+        </p:blipFill>
+        <p:spPr>
+          <a:xfrm>
+            <a:off x="1410739" y="313067"/>
+            <a:ext cx="2743200" cy="2743200"/>
+          </a:xfrm>
+          <a:prstGeom prst="ellipse">
+            <a:avLst/>
+          </a:prstGeom>
+          <a:solidFill>
+            <a:schemeClr val="bg2"/>
+          </a:solidFill>
+        </p:spPr>
+      </p:pic>
+    </p:spTree>
+    <p:extLst>
+      <p:ext uri="{BB962C8B-B14F-4D97-AF65-F5344CB8AC3E}">
+        <p14:creationId xmlns:p14="http://schemas.microsoft.com/office/powerpoint/2010/main" val="2101206071"/>
+      </p:ext>
+    </p:extLst>
+  </p:cSld>
+  <p:clrMapOvr>
+    <a:masterClrMapping/>
+  </p:clrMapOvr>
+</p:sld>
+</file>
+
+<file path=ppt/slides/slide6.xml><?xml version="1.0" encoding="utf-8"?>
 <p:sld xmlns:a="http://schemas.openxmlformats.org/drawingml/2006/main" xmlns:r="http://schemas.openxmlformats.org/officeDocument/2006/relationships" xmlns:p="http://schemas.openxmlformats.org/presentationml/2006/main">
   <p:cSld>
     <p:bg>

</xml_diff>

<commit_message>
update portfolio with statuequest
</commit_message>
<xml_diff>
--- a/img/portfolio/portfolioimages.pptx
+++ b/img/portfolio/portfolioimages.pptx
@@ -5,7 +5,7 @@
     <p:sldMasterId id="2147483660" r:id="rId1"/>
   </p:sldMasterIdLst>
   <p:notesMasterIdLst>
-    <p:notesMasterId r:id="rId9"/>
+    <p:notesMasterId r:id="rId10"/>
   </p:notesMasterIdLst>
   <p:sldIdLst>
     <p:sldId id="256" r:id="rId2"/>
@@ -14,7 +14,8 @@
     <p:sldId id="260" r:id="rId5"/>
     <p:sldId id="261" r:id="rId6"/>
     <p:sldId id="262" r:id="rId7"/>
-    <p:sldId id="259" r:id="rId8"/>
+    <p:sldId id="263" r:id="rId8"/>
+    <p:sldId id="259" r:id="rId9"/>
   </p:sldIdLst>
   <p:sldSz cx="5705475" cy="4114800"/>
   <p:notesSz cx="6858000" cy="9144000"/>
@@ -214,7 +215,7 @@
           <a:p>
             <a:fld id="{FCFBAACC-0C4E-6A46-909C-311DADBEBC3F}" type="datetimeFigureOut">
               <a:rPr lang="en-US" smtClean="0"/>
-              <a:t>5/13/19</a:t>
+              <a:t>6/2/19</a:t>
             </a:fld>
             <a:endParaRPr lang="en-US"/>
           </a:p>
@@ -612,7 +613,7 @@
           <a:p>
             <a:fld id="{08259A66-32B0-534A-AA69-658707479B3F}" type="datetimeFigureOut">
               <a:rPr lang="en-US" smtClean="0"/>
-              <a:t>5/13/19</a:t>
+              <a:t>6/2/19</a:t>
             </a:fld>
             <a:endParaRPr lang="en-US"/>
           </a:p>
@@ -782,7 +783,7 @@
           <a:p>
             <a:fld id="{08259A66-32B0-534A-AA69-658707479B3F}" type="datetimeFigureOut">
               <a:rPr lang="en-US" smtClean="0"/>
-              <a:t>5/13/19</a:t>
+              <a:t>6/2/19</a:t>
             </a:fld>
             <a:endParaRPr lang="en-US"/>
           </a:p>
@@ -962,7 +963,7 @@
           <a:p>
             <a:fld id="{08259A66-32B0-534A-AA69-658707479B3F}" type="datetimeFigureOut">
               <a:rPr lang="en-US" smtClean="0"/>
-              <a:t>5/13/19</a:t>
+              <a:t>6/2/19</a:t>
             </a:fld>
             <a:endParaRPr lang="en-US"/>
           </a:p>
@@ -1132,7 +1133,7 @@
           <a:p>
             <a:fld id="{08259A66-32B0-534A-AA69-658707479B3F}" type="datetimeFigureOut">
               <a:rPr lang="en-US" smtClean="0"/>
-              <a:t>5/13/19</a:t>
+              <a:t>6/2/19</a:t>
             </a:fld>
             <a:endParaRPr lang="en-US"/>
           </a:p>
@@ -1376,7 +1377,7 @@
           <a:p>
             <a:fld id="{08259A66-32B0-534A-AA69-658707479B3F}" type="datetimeFigureOut">
               <a:rPr lang="en-US" smtClean="0"/>
-              <a:t>5/13/19</a:t>
+              <a:t>6/2/19</a:t>
             </a:fld>
             <a:endParaRPr lang="en-US"/>
           </a:p>
@@ -1608,7 +1609,7 @@
           <a:p>
             <a:fld id="{08259A66-32B0-534A-AA69-658707479B3F}" type="datetimeFigureOut">
               <a:rPr lang="en-US" smtClean="0"/>
-              <a:t>5/13/19</a:t>
+              <a:t>6/2/19</a:t>
             </a:fld>
             <a:endParaRPr lang="en-US"/>
           </a:p>
@@ -1975,7 +1976,7 @@
           <a:p>
             <a:fld id="{08259A66-32B0-534A-AA69-658707479B3F}" type="datetimeFigureOut">
               <a:rPr lang="en-US" smtClean="0"/>
-              <a:t>5/13/19</a:t>
+              <a:t>6/2/19</a:t>
             </a:fld>
             <a:endParaRPr lang="en-US"/>
           </a:p>
@@ -2093,7 +2094,7 @@
           <a:p>
             <a:fld id="{08259A66-32B0-534A-AA69-658707479B3F}" type="datetimeFigureOut">
               <a:rPr lang="en-US" smtClean="0"/>
-              <a:t>5/13/19</a:t>
+              <a:t>6/2/19</a:t>
             </a:fld>
             <a:endParaRPr lang="en-US"/>
           </a:p>
@@ -2188,7 +2189,7 @@
           <a:p>
             <a:fld id="{08259A66-32B0-534A-AA69-658707479B3F}" type="datetimeFigureOut">
               <a:rPr lang="en-US" smtClean="0"/>
-              <a:t>5/13/19</a:t>
+              <a:t>6/2/19</a:t>
             </a:fld>
             <a:endParaRPr lang="en-US"/>
           </a:p>
@@ -2465,7 +2466,7 @@
           <a:p>
             <a:fld id="{08259A66-32B0-534A-AA69-658707479B3F}" type="datetimeFigureOut">
               <a:rPr lang="en-US" smtClean="0"/>
-              <a:t>5/13/19</a:t>
+              <a:t>6/2/19</a:t>
             </a:fld>
             <a:endParaRPr lang="en-US"/>
           </a:p>
@@ -2722,7 +2723,7 @@
           <a:p>
             <a:fld id="{08259A66-32B0-534A-AA69-658707479B3F}" type="datetimeFigureOut">
               <a:rPr lang="en-US" smtClean="0"/>
-              <a:t>5/13/19</a:t>
+              <a:t>6/2/19</a:t>
             </a:fld>
             <a:endParaRPr lang="en-US"/>
           </a:p>
@@ -2935,7 +2936,7 @@
           <a:p>
             <a:fld id="{08259A66-32B0-534A-AA69-658707479B3F}" type="datetimeFigureOut">
               <a:rPr lang="en-US" smtClean="0"/>
-              <a:t>5/13/19</a:t>
+              <a:t>6/2/19</a:t>
             </a:fld>
             <a:endParaRPr lang="en-US"/>
           </a:p>
@@ -4050,6 +4051,127 @@
 </file>
 
 <file path=ppt/slides/slide7.xml><?xml version="1.0" encoding="utf-8"?>
+<p:sld xmlns:a="http://schemas.openxmlformats.org/drawingml/2006/main" xmlns:r="http://schemas.openxmlformats.org/officeDocument/2006/relationships" xmlns:p="http://schemas.openxmlformats.org/presentationml/2006/main">
+  <p:cSld>
+    <p:bg>
+      <p:bgPr>
+        <a:solidFill>
+          <a:srgbClr val="B39D9D"/>
+        </a:solidFill>
+        <a:effectLst/>
+      </p:bgPr>
+    </p:bg>
+    <p:spTree>
+      <p:nvGrpSpPr>
+        <p:cNvPr id="1" name=""/>
+        <p:cNvGrpSpPr/>
+        <p:nvPr/>
+      </p:nvGrpSpPr>
+      <p:grpSpPr>
+        <a:xfrm>
+          <a:off x="0" y="0"/>
+          <a:ext cx="0" cy="0"/>
+          <a:chOff x="0" y="0"/>
+          <a:chExt cx="0" cy="0"/>
+        </a:xfrm>
+      </p:grpSpPr>
+      <p:sp>
+        <p:nvSpPr>
+          <p:cNvPr id="10" name="Rectangle 9">
+            <a:extLst>
+              <a:ext uri="{FF2B5EF4-FFF2-40B4-BE49-F238E27FC236}">
+                <a16:creationId xmlns:a16="http://schemas.microsoft.com/office/drawing/2014/main" id="{4D1E4AAC-E67E-CC4B-99E0-D6BB79E3C2E3}"/>
+              </a:ext>
+            </a:extLst>
+          </p:cNvPr>
+          <p:cNvSpPr/>
+          <p:nvPr/>
+        </p:nvSpPr>
+        <p:spPr>
+          <a:xfrm>
+            <a:off x="985634" y="3056267"/>
+            <a:ext cx="3593421" cy="769441"/>
+          </a:xfrm>
+          <a:prstGeom prst="rect">
+            <a:avLst/>
+          </a:prstGeom>
+          <a:noFill/>
+        </p:spPr>
+        <p:txBody>
+          <a:bodyPr wrap="none" lIns="91440" tIns="45720" rIns="91440" bIns="45720">
+            <a:spAutoFit/>
+          </a:bodyPr>
+          <a:lstStyle/>
+          <a:p>
+            <a:pPr algn="ctr"/>
+            <a:r>
+              <a:rPr lang="en-US" sz="4400" b="1" cap="none" spc="0" dirty="0">
+                <a:ln w="0"/>
+                <a:solidFill>
+                  <a:srgbClr val="2C3E50"/>
+                </a:solidFill>
+                <a:effectLst>
+                  <a:outerShdw blurRad="38100" dist="25400" dir="5400000" algn="ctr" rotWithShape="0">
+                    <a:srgbClr val="6E747A">
+                      <a:alpha val="43000"/>
+                    </a:srgbClr>
+                  </a:outerShdw>
+                </a:effectLst>
+                <a:latin typeface="Lato Black" panose="020F0A02020204030203" pitchFamily="34" charset="0"/>
+                <a:ea typeface="Roboto Black" panose="02000000000000000000" pitchFamily="2" charset="0"/>
+              </a:rPr>
+              <a:t>STATUE QUEST</a:t>
+            </a:r>
+          </a:p>
+        </p:txBody>
+      </p:sp>
+      <p:pic>
+        <p:nvPicPr>
+          <p:cNvPr id="4" name="Picture 3">
+            <a:extLst>
+              <a:ext uri="{FF2B5EF4-FFF2-40B4-BE49-F238E27FC236}">
+                <a16:creationId xmlns:a16="http://schemas.microsoft.com/office/drawing/2014/main" id="{B9FD77E4-62A3-8346-8426-123442A50E07}"/>
+              </a:ext>
+            </a:extLst>
+          </p:cNvPr>
+          <p:cNvPicPr>
+            <a:picLocks noChangeAspect="1"/>
+          </p:cNvPicPr>
+          <p:nvPr/>
+        </p:nvPicPr>
+        <p:blipFill>
+          <a:blip r:embed="rId2"/>
+          <a:stretch>
+            <a:fillRect/>
+          </a:stretch>
+        </p:blipFill>
+        <p:spPr>
+          <a:xfrm>
+            <a:off x="1410739" y="313067"/>
+            <a:ext cx="2743200" cy="2743200"/>
+          </a:xfrm>
+          <a:prstGeom prst="ellipse">
+            <a:avLst/>
+          </a:prstGeom>
+          <a:solidFill>
+            <a:schemeClr val="bg2"/>
+          </a:solidFill>
+        </p:spPr>
+      </p:pic>
+    </p:spTree>
+    <p:extLst>
+      <p:ext uri="{BB962C8B-B14F-4D97-AF65-F5344CB8AC3E}">
+        <p14:creationId xmlns:p14="http://schemas.microsoft.com/office/powerpoint/2010/main" val="2425310492"/>
+      </p:ext>
+    </p:extLst>
+  </p:cSld>
+  <p:clrMapOvr>
+    <a:masterClrMapping/>
+  </p:clrMapOvr>
+</p:sld>
+</file>
+
+<file path=ppt/slides/slide8.xml><?xml version="1.0" encoding="utf-8"?>
 <p:sld xmlns:a="http://schemas.openxmlformats.org/drawingml/2006/main" xmlns:r="http://schemas.openxmlformats.org/officeDocument/2006/relationships" xmlns:p="http://schemas.openxmlformats.org/presentationml/2006/main">
   <p:cSld>
     <p:bg>

</xml_diff>